<commit_message>
Added Component Injection demo
</commit_message>
<xml_diff>
--- a/slides/React Patterns.pptx
+++ b/slides/React Patterns.pptx
@@ -5,7 +5,7 @@
     <p:sldMasterId id="2147483696" r:id="rId1"/>
   </p:sldMasterIdLst>
   <p:notesMasterIdLst>
-    <p:notesMasterId r:id="rId10"/>
+    <p:notesMasterId r:id="rId11"/>
   </p:notesMasterIdLst>
   <p:sldIdLst>
     <p:sldId id="256" r:id="rId2"/>
@@ -15,7 +15,8 @@
     <p:sldId id="258" r:id="rId6"/>
     <p:sldId id="260" r:id="rId7"/>
     <p:sldId id="261" r:id="rId8"/>
-    <p:sldId id="264" r:id="rId9"/>
+    <p:sldId id="265" r:id="rId9"/>
+    <p:sldId id="264" r:id="rId10"/>
   </p:sldIdLst>
   <p:sldSz cx="12192000" cy="6858000"/>
   <p:notesSz cx="6858000" cy="9144000"/>
@@ -114,6 +115,11 @@
       </a:defRPr>
     </a:lvl9pPr>
   </p:defaultTextStyle>
+  <p:extLst>
+    <p:ext uri="{EFAFB233-063F-42B5-8137-9DF3F51BA10A}">
+      <p15:sldGuideLst xmlns:p15="http://schemas.microsoft.com/office/powerpoint/2012/main"/>
+    </p:ext>
+  </p:extLst>
 </p:presentation>
 </file>
 
@@ -932,7 +938,7 @@
           <a:bodyPr/>
           <a:lstStyle/>
           <a:p>
-            <a:pPr marL="0" marR="0" indent="0" algn="l" defTabSz="914400" rtl="0" eaLnBrk="1" fontAlgn="auto" latinLnBrk="0" hangingPunct="1">
+            <a:pPr marL="171450" marR="0" indent="-171450" algn="l" defTabSz="914400" rtl="0" eaLnBrk="1" fontAlgn="auto" latinLnBrk="0" hangingPunct="1">
               <a:lnSpc>
                 <a:spcPct val="100000"/>
               </a:lnSpc>
@@ -945,13 +951,17 @@
               <a:buClrTx/>
               <a:buSzTx/>
               <a:buFontTx/>
-              <a:buNone/>
+              <a:buChar char="-"/>
               <a:tabLst/>
               <a:defRPr/>
             </a:pPr>
             <a:r>
               <a:rPr lang="en-GB" dirty="0" smtClean="0"/>
-              <a:t>- Avoid the drawbacks of </a:t>
+              <a:t>Avoid </a:t>
+            </a:r>
+            <a:r>
+              <a:rPr lang="en-GB" dirty="0" smtClean="0"/>
+              <a:t>the drawbacks of </a:t>
             </a:r>
             <a:r>
               <a:rPr lang="en-GB" dirty="0" err="1" smtClean="0"/>
@@ -959,11 +969,48 @@
             </a:r>
             <a:r>
               <a:rPr lang="en-GB" dirty="0" smtClean="0"/>
-              <a:t> and HOCs</a:t>
-            </a:r>
-          </a:p>
-          <a:p>
-            <a:endParaRPr lang="en-US" dirty="0"/>
+              <a:t> and </a:t>
+            </a:r>
+            <a:r>
+              <a:rPr lang="en-GB" dirty="0" smtClean="0"/>
+              <a:t>HOCs</a:t>
+            </a:r>
+          </a:p>
+          <a:p>
+            <a:pPr marL="171450" marR="0" indent="-171450" algn="l" defTabSz="914400" rtl="0" eaLnBrk="1" fontAlgn="auto" latinLnBrk="0" hangingPunct="1">
+              <a:lnSpc>
+                <a:spcPct val="100000"/>
+              </a:lnSpc>
+              <a:spcBef>
+                <a:spcPts val="0"/>
+              </a:spcBef>
+              <a:spcAft>
+                <a:spcPts val="0"/>
+              </a:spcAft>
+              <a:buClrTx/>
+              <a:buSzTx/>
+              <a:buFontTx/>
+              <a:buChar char="-"/>
+              <a:tabLst/>
+              <a:defRPr/>
+            </a:pPr>
+            <a:r>
+              <a:rPr lang="en-GB" dirty="0" smtClean="0"/>
+              <a:t>React Motion, React Router, React Virtualized</a:t>
+            </a:r>
+            <a:r>
+              <a:rPr lang="en-GB" baseline="0" dirty="0" smtClean="0"/>
+              <a:t> (</a:t>
+            </a:r>
+            <a:r>
+              <a:rPr lang="en-GB" baseline="0" dirty="0" err="1" smtClean="0"/>
+              <a:t>AutoSizer</a:t>
+            </a:r>
+            <a:r>
+              <a:rPr lang="en-GB" baseline="0" dirty="0" smtClean="0"/>
+              <a:t>)</a:t>
+            </a:r>
+            <a:endParaRPr lang="en-GB" dirty="0" smtClean="0"/>
           </a:p>
         </p:txBody>
       </p:sp>
@@ -994,6 +1041,150 @@
     <p:extLst>
       <p:ext uri="{BB962C8B-B14F-4D97-AF65-F5344CB8AC3E}">
         <p14:creationId xmlns:p14="http://schemas.microsoft.com/office/powerpoint/2010/main" val="1727491647"/>
+      </p:ext>
+    </p:extLst>
+  </p:cSld>
+  <p:clrMapOvr>
+    <a:masterClrMapping/>
+  </p:clrMapOvr>
+</p:notes>
+</file>
+
+<file path=ppt/notesSlides/notesSlide6.xml><?xml version="1.0" encoding="utf-8"?>
+<p:notes xmlns:a="http://schemas.openxmlformats.org/drawingml/2006/main" xmlns:r="http://schemas.openxmlformats.org/officeDocument/2006/relationships" xmlns:p="http://schemas.openxmlformats.org/presentationml/2006/main">
+  <p:cSld>
+    <p:spTree>
+      <p:nvGrpSpPr>
+        <p:cNvPr id="1" name=""/>
+        <p:cNvGrpSpPr/>
+        <p:nvPr/>
+      </p:nvGrpSpPr>
+      <p:grpSpPr>
+        <a:xfrm>
+          <a:off x="0" y="0"/>
+          <a:ext cx="0" cy="0"/>
+          <a:chOff x="0" y="0"/>
+          <a:chExt cx="0" cy="0"/>
+        </a:xfrm>
+      </p:grpSpPr>
+      <p:sp>
+        <p:nvSpPr>
+          <p:cNvPr id="2" name="Slide Image Placeholder 1"/>
+          <p:cNvSpPr>
+            <a:spLocks noGrp="1" noRot="1" noChangeAspect="1"/>
+          </p:cNvSpPr>
+          <p:nvPr>
+            <p:ph type="sldImg"/>
+          </p:nvPr>
+        </p:nvSpPr>
+        <p:spPr/>
+      </p:sp>
+      <p:sp>
+        <p:nvSpPr>
+          <p:cNvPr id="3" name="Notes Placeholder 2"/>
+          <p:cNvSpPr>
+            <a:spLocks noGrp="1"/>
+          </p:cNvSpPr>
+          <p:nvPr>
+            <p:ph type="body" idx="1"/>
+          </p:nvPr>
+        </p:nvSpPr>
+        <p:spPr/>
+        <p:txBody>
+          <a:bodyPr/>
+          <a:lstStyle/>
+          <a:p>
+            <a:r>
+              <a:rPr lang="en-GB" sz="1200" b="0" i="0" kern="1200" dirty="0" smtClean="0">
+                <a:solidFill>
+                  <a:schemeClr val="tx1"/>
+                </a:solidFill>
+                <a:effectLst/>
+                <a:latin typeface="+mn-lt"/>
+                <a:ea typeface="+mn-ea"/>
+                <a:cs typeface="+mn-cs"/>
+              </a:rPr>
+              <a:t>Function as Child Component, Function as Prop Component, and Component Injection – the means to render is passed into the component, and the component “calls back” to perform the rendering. All three are </a:t>
+            </a:r>
+            <a:r>
+              <a:rPr lang="en-GB" sz="1200" b="0" i="1" kern="1200" dirty="0" smtClean="0">
+                <a:solidFill>
+                  <a:schemeClr val="tx1"/>
+                </a:solidFill>
+                <a:effectLst/>
+                <a:latin typeface="+mn-lt"/>
+                <a:ea typeface="+mn-ea"/>
+                <a:cs typeface="+mn-cs"/>
+              </a:rPr>
+              <a:t>implementations</a:t>
+            </a:r>
+            <a:r>
+              <a:rPr lang="en-GB" sz="1200" b="0" i="0" kern="1200" dirty="0" smtClean="0">
+                <a:solidFill>
+                  <a:schemeClr val="tx1"/>
+                </a:solidFill>
+                <a:effectLst/>
+                <a:latin typeface="+mn-lt"/>
+                <a:ea typeface="+mn-ea"/>
+                <a:cs typeface="+mn-cs"/>
+              </a:rPr>
+              <a:t> of a render </a:t>
+            </a:r>
+            <a:r>
+              <a:rPr lang="en-GB" sz="1200" b="0" i="0" kern="1200" dirty="0" err="1" smtClean="0">
+                <a:solidFill>
+                  <a:schemeClr val="tx1"/>
+                </a:solidFill>
+                <a:effectLst/>
+                <a:latin typeface="+mn-lt"/>
+                <a:ea typeface="+mn-ea"/>
+                <a:cs typeface="+mn-cs"/>
+              </a:rPr>
+              <a:t>callback</a:t>
+            </a:r>
+            <a:r>
+              <a:rPr lang="en-GB" sz="1200" b="0" i="0" kern="1200" dirty="0" smtClean="0">
+                <a:solidFill>
+                  <a:schemeClr val="tx1"/>
+                </a:solidFill>
+                <a:effectLst/>
+                <a:latin typeface="+mn-lt"/>
+                <a:ea typeface="+mn-ea"/>
+                <a:cs typeface="+mn-cs"/>
+              </a:rPr>
+              <a:t>.</a:t>
+            </a:r>
+            <a:endParaRPr lang="en-US" dirty="0"/>
+          </a:p>
+        </p:txBody>
+      </p:sp>
+      <p:sp>
+        <p:nvSpPr>
+          <p:cNvPr id="4" name="Slide Number Placeholder 3"/>
+          <p:cNvSpPr>
+            <a:spLocks noGrp="1"/>
+          </p:cNvSpPr>
+          <p:nvPr>
+            <p:ph type="sldNum" sz="quarter" idx="10"/>
+          </p:nvPr>
+        </p:nvSpPr>
+        <p:spPr/>
+        <p:txBody>
+          <a:bodyPr/>
+          <a:lstStyle/>
+          <a:p>
+            <a:fld id="{DA5C97A4-581E-44CF-A2CC-C75B82FF55BD}" type="slidenum">
+              <a:rPr lang="en-US" smtClean="0"/>
+              <a:t>8</a:t>
+            </a:fld>
+            <a:endParaRPr lang="en-US"/>
+          </a:p>
+        </p:txBody>
+      </p:sp>
+    </p:spTree>
+    <p:extLst>
+      <p:ext uri="{BB962C8B-B14F-4D97-AF65-F5344CB8AC3E}">
+        <p14:creationId xmlns:p14="http://schemas.microsoft.com/office/powerpoint/2010/main" val="613240196"/>
       </p:ext>
     </p:extLst>
   </p:cSld>
@@ -7309,13 +7500,13 @@
   <p:clrMapOvr>
     <a:masterClrMapping/>
   </p:clrMapOvr>
-  <mc:AlternateContent xmlns:mc="http://schemas.openxmlformats.org/markup-compatibility/2006">
-    <mc:Choice xmlns:p14="http://schemas.microsoft.com/office/powerpoint/2010/main" Requires="p14">
+  <mc:AlternateContent xmlns:mc="http://schemas.openxmlformats.org/markup-compatibility/2006" xmlns:p14="http://schemas.microsoft.com/office/powerpoint/2010/main">
+    <mc:Choice Requires="p14">
       <p:transition spd="slow" p14:dur="1500">
         <p:split orient="vert"/>
       </p:transition>
     </mc:Choice>
-    <mc:Fallback>
+    <mc:Fallback xmlns="">
       <p:transition spd="slow">
         <p:split orient="vert"/>
       </p:transition>
@@ -8899,13 +9090,13 @@
   <p:clrMapOvr>
     <a:masterClrMapping/>
   </p:clrMapOvr>
-  <mc:AlternateContent xmlns:mc="http://schemas.openxmlformats.org/markup-compatibility/2006">
-    <mc:Choice xmlns:p14="http://schemas.microsoft.com/office/powerpoint/2010/main" Requires="p14">
+  <mc:AlternateContent xmlns:mc="http://schemas.openxmlformats.org/markup-compatibility/2006" xmlns:p14="http://schemas.microsoft.com/office/powerpoint/2010/main">
+    <mc:Choice Requires="p14">
       <p:transition spd="slow" p14:dur="1500">
         <p:split orient="vert"/>
       </p:transition>
     </mc:Choice>
-    <mc:Fallback>
+    <mc:Fallback xmlns="">
       <p:transition spd="slow">
         <p:split orient="vert"/>
       </p:transition>
@@ -9189,6 +9380,127 @@
 </file>
 
 <file path=ppt/slides/slide8.xml><?xml version="1.0" encoding="utf-8"?>
+<p:sld xmlns:a="http://schemas.openxmlformats.org/drawingml/2006/main" xmlns:r="http://schemas.openxmlformats.org/officeDocument/2006/relationships" xmlns:p="http://schemas.openxmlformats.org/presentationml/2006/main">
+  <p:cSld>
+    <p:spTree>
+      <p:nvGrpSpPr>
+        <p:cNvPr id="1" name=""/>
+        <p:cNvGrpSpPr/>
+        <p:nvPr/>
+      </p:nvGrpSpPr>
+      <p:grpSpPr>
+        <a:xfrm>
+          <a:off x="0" y="0"/>
+          <a:ext cx="0" cy="0"/>
+          <a:chOff x="0" y="0"/>
+          <a:chExt cx="0" cy="0"/>
+        </a:xfrm>
+      </p:grpSpPr>
+      <p:sp>
+        <p:nvSpPr>
+          <p:cNvPr id="2" name="Title 1"/>
+          <p:cNvSpPr>
+            <a:spLocks noGrp="1"/>
+          </p:cNvSpPr>
+          <p:nvPr>
+            <p:ph type="title"/>
+          </p:nvPr>
+        </p:nvSpPr>
+        <p:spPr/>
+        <p:txBody>
+          <a:bodyPr/>
+          <a:lstStyle/>
+          <a:p>
+            <a:r>
+              <a:rPr lang="en-US" b="1" dirty="0"/>
+              <a:t>Component </a:t>
+            </a:r>
+            <a:r>
+              <a:rPr lang="en-US" b="1" dirty="0" smtClean="0"/>
+              <a:t>Injection</a:t>
+            </a:r>
+            <a:endParaRPr lang="en-US" b="1" dirty="0"/>
+          </a:p>
+        </p:txBody>
+      </p:sp>
+      <p:sp>
+        <p:nvSpPr>
+          <p:cNvPr id="3" name="Content Placeholder 2"/>
+          <p:cNvSpPr>
+            <a:spLocks noGrp="1"/>
+          </p:cNvSpPr>
+          <p:nvPr>
+            <p:ph idx="1"/>
+          </p:nvPr>
+        </p:nvSpPr>
+        <p:spPr/>
+        <p:txBody>
+          <a:bodyPr/>
+          <a:lstStyle/>
+          <a:p>
+            <a:r>
+              <a:rPr lang="en-GB" dirty="0" smtClean="0"/>
+              <a:t>Instead </a:t>
+            </a:r>
+            <a:r>
+              <a:rPr lang="en-GB" dirty="0"/>
+              <a:t>of calling a function to render, we should pass a component.</a:t>
+            </a:r>
+          </a:p>
+          <a:p>
+            <a:pPr lvl="1"/>
+            <a:r>
+              <a:rPr lang="en-GB" dirty="0" smtClean="0"/>
+              <a:t>JSX Composition</a:t>
+            </a:r>
+          </a:p>
+          <a:p>
+            <a:pPr lvl="1"/>
+            <a:r>
+              <a:rPr lang="en-GB" dirty="0" smtClean="0"/>
+              <a:t>Easier </a:t>
+            </a:r>
+            <a:r>
+              <a:rPr lang="en-GB" dirty="0"/>
+              <a:t>run-time altering of components and increased ease of mocking tests</a:t>
+            </a:r>
+            <a:endParaRPr lang="en-US" dirty="0"/>
+          </a:p>
+        </p:txBody>
+      </p:sp>
+    </p:spTree>
+    <p:extLst>
+      <p:ext uri="{BB962C8B-B14F-4D97-AF65-F5344CB8AC3E}">
+        <p14:creationId xmlns:p14="http://schemas.microsoft.com/office/powerpoint/2010/main" val="787276190"/>
+      </p:ext>
+    </p:extLst>
+  </p:cSld>
+  <p:clrMapOvr>
+    <a:masterClrMapping/>
+  </p:clrMapOvr>
+  <mc:AlternateContent xmlns:mc="http://schemas.openxmlformats.org/markup-compatibility/2006">
+    <mc:Choice xmlns:p14="http://schemas.microsoft.com/office/powerpoint/2010/main" Requires="p14">
+      <p:transition spd="slow" p14:dur="1500">
+        <p:split orient="vert"/>
+      </p:transition>
+    </mc:Choice>
+    <mc:Fallback>
+      <p:transition spd="slow">
+        <p:split orient="vert"/>
+      </p:transition>
+    </mc:Fallback>
+  </mc:AlternateContent>
+  <p:timing>
+    <p:tnLst>
+      <p:par>
+        <p:cTn id="1" dur="indefinite" restart="never" nodeType="tmRoot"/>
+      </p:par>
+    </p:tnLst>
+  </p:timing>
+</p:sld>
+</file>
+
+<file path=ppt/slides/slide9.xml><?xml version="1.0" encoding="utf-8"?>
 <p:sld xmlns:a="http://schemas.openxmlformats.org/drawingml/2006/main" xmlns:r="http://schemas.openxmlformats.org/officeDocument/2006/relationships" xmlns:p="http://schemas.openxmlformats.org/presentationml/2006/main">
   <p:cSld>
     <p:spTree>

</xml_diff>